<commit_message>
update data system share1
</commit_message>
<xml_diff>
--- a/data-system/data-system-share1_v1.pptx
+++ b/data-system/data-system-share1_v1.pptx
@@ -256,7 +256,7 @@
           <a:p>
             <a:fld id="{747AC9F4-C18A-4AAE-A4C5-5EC03AC0D571}" type="datetimeFigureOut">
               <a:rPr lang="zh-CN" altLang="en-US" smtClean="0"/>
-              <a:t>2019/5/9</a:t>
+              <a:t>2019/9/16</a:t>
             </a:fld>
             <a:endParaRPr lang="zh-CN" altLang="en-US"/>
           </a:p>
@@ -7547,7 +7547,7 @@
           <a:p>
             <a:fld id="{A9AB96BA-27DC-428C-951A-8206D1376619}" type="datetimeFigureOut">
               <a:rPr lang="zh-CN" altLang="en-US" smtClean="0"/>
-              <a:t>2019/5/9</a:t>
+              <a:t>2019/9/16</a:t>
             </a:fld>
             <a:endParaRPr lang="zh-CN" altLang="en-US"/>
           </a:p>
@@ -7715,7 +7715,7 @@
           <a:p>
             <a:fld id="{A9AB96BA-27DC-428C-951A-8206D1376619}" type="datetimeFigureOut">
               <a:rPr lang="zh-CN" altLang="en-US" smtClean="0"/>
-              <a:t>2019/5/9</a:t>
+              <a:t>2019/9/16</a:t>
             </a:fld>
             <a:endParaRPr lang="zh-CN" altLang="en-US"/>
           </a:p>
@@ -7893,7 +7893,7 @@
           <a:p>
             <a:fld id="{A9AB96BA-27DC-428C-951A-8206D1376619}" type="datetimeFigureOut">
               <a:rPr lang="zh-CN" altLang="en-US" smtClean="0"/>
-              <a:t>2019/5/9</a:t>
+              <a:t>2019/9/16</a:t>
             </a:fld>
             <a:endParaRPr lang="zh-CN" altLang="en-US"/>
           </a:p>
@@ -8061,7 +8061,7 @@
           <a:p>
             <a:fld id="{A9AB96BA-27DC-428C-951A-8206D1376619}" type="datetimeFigureOut">
               <a:rPr lang="zh-CN" altLang="en-US" smtClean="0"/>
-              <a:t>2019/5/9</a:t>
+              <a:t>2019/9/16</a:t>
             </a:fld>
             <a:endParaRPr lang="zh-CN" altLang="en-US"/>
           </a:p>
@@ -8306,7 +8306,7 @@
           <a:p>
             <a:fld id="{A9AB96BA-27DC-428C-951A-8206D1376619}" type="datetimeFigureOut">
               <a:rPr lang="zh-CN" altLang="en-US" smtClean="0"/>
-              <a:t>2019/5/9</a:t>
+              <a:t>2019/9/16</a:t>
             </a:fld>
             <a:endParaRPr lang="zh-CN" altLang="en-US"/>
           </a:p>
@@ -8535,7 +8535,7 @@
           <a:p>
             <a:fld id="{A9AB96BA-27DC-428C-951A-8206D1376619}" type="datetimeFigureOut">
               <a:rPr lang="zh-CN" altLang="en-US" smtClean="0"/>
-              <a:t>2019/5/9</a:t>
+              <a:t>2019/9/16</a:t>
             </a:fld>
             <a:endParaRPr lang="zh-CN" altLang="en-US"/>
           </a:p>
@@ -8899,7 +8899,7 @@
           <a:p>
             <a:fld id="{A9AB96BA-27DC-428C-951A-8206D1376619}" type="datetimeFigureOut">
               <a:rPr lang="zh-CN" altLang="en-US" smtClean="0"/>
-              <a:t>2019/5/9</a:t>
+              <a:t>2019/9/16</a:t>
             </a:fld>
             <a:endParaRPr lang="zh-CN" altLang="en-US"/>
           </a:p>
@@ -9016,7 +9016,7 @@
           <a:p>
             <a:fld id="{A9AB96BA-27DC-428C-951A-8206D1376619}" type="datetimeFigureOut">
               <a:rPr lang="zh-CN" altLang="en-US" smtClean="0"/>
-              <a:t>2019/5/9</a:t>
+              <a:t>2019/9/16</a:t>
             </a:fld>
             <a:endParaRPr lang="zh-CN" altLang="en-US"/>
           </a:p>
@@ -9111,7 +9111,7 @@
           <a:p>
             <a:fld id="{A9AB96BA-27DC-428C-951A-8206D1376619}" type="datetimeFigureOut">
               <a:rPr lang="zh-CN" altLang="en-US" smtClean="0"/>
-              <a:t>2019/5/9</a:t>
+              <a:t>2019/9/16</a:t>
             </a:fld>
             <a:endParaRPr lang="zh-CN" altLang="en-US"/>
           </a:p>
@@ -9386,7 +9386,7 @@
           <a:p>
             <a:fld id="{A9AB96BA-27DC-428C-951A-8206D1376619}" type="datetimeFigureOut">
               <a:rPr lang="zh-CN" altLang="en-US" smtClean="0"/>
-              <a:t>2019/5/9</a:t>
+              <a:t>2019/9/16</a:t>
             </a:fld>
             <a:endParaRPr lang="zh-CN" altLang="en-US"/>
           </a:p>
@@ -9638,7 +9638,7 @@
           <a:p>
             <a:fld id="{A9AB96BA-27DC-428C-951A-8206D1376619}" type="datetimeFigureOut">
               <a:rPr lang="zh-CN" altLang="en-US" smtClean="0"/>
-              <a:t>2019/5/9</a:t>
+              <a:t>2019/9/16</a:t>
             </a:fld>
             <a:endParaRPr lang="zh-CN" altLang="en-US"/>
           </a:p>
@@ -9849,7 +9849,7 @@
           <a:p>
             <a:fld id="{A9AB96BA-27DC-428C-951A-8206D1376619}" type="datetimeFigureOut">
               <a:rPr lang="zh-CN" altLang="en-US" smtClean="0"/>
-              <a:t>2019/5/9</a:t>
+              <a:t>2019/9/16</a:t>
             </a:fld>
             <a:endParaRPr lang="zh-CN" altLang="en-US"/>
           </a:p>
@@ -10368,16 +10368,7 @@
           </a:bodyPr>
           <a:lstStyle/>
           <a:p>
-            <a:r>
-              <a:rPr lang="zh-CN" altLang="en-US" sz="2000" dirty="0">
-                <a:solidFill>
-                  <a:schemeClr val="bg1"/>
-                </a:solidFill>
-                <a:latin typeface="微软雅黑" panose="020B0503020204020204" pitchFamily="34" charset="-122"/>
-                <a:ea typeface="微软雅黑" panose="020B0503020204020204" pitchFamily="34" charset="-122"/>
-              </a:rPr>
-              <a:t>主讲人：</a:t>
-            </a:r>
+            <a:pPr algn="ctr"/>
             <a:r>
               <a:rPr lang="zh-CN" sz="2000" dirty="0">
                 <a:solidFill>

</xml_diff>